<commit_message>
Update Design and Preprocessing
</commit_message>
<xml_diff>
--- a/design/references/Overview.pptx
+++ b/design/references/Overview.pptx
@@ -5,10 +5,11 @@
     <p:sldMasterId id="2147483648" r:id="rId1"/>
   </p:sldMasterIdLst>
   <p:notesMasterIdLst>
-    <p:notesMasterId r:id="rId3"/>
+    <p:notesMasterId r:id="rId4"/>
   </p:notesMasterIdLst>
   <p:sldIdLst>
     <p:sldId id="256" r:id="rId2"/>
+    <p:sldId id="257" r:id="rId3"/>
   </p:sldIdLst>
   <p:sldSz cx="12192000" cy="6858000"/>
   <p:notesSz cx="6858000" cy="9144000"/>
@@ -107,6 +108,11 @@
       </a:defRPr>
     </a:lvl9pPr>
   </p:defaultTextStyle>
+  <p:extLst>
+    <p:ext uri="{EFAFB233-063F-42B5-8137-9DF3F51BA10A}">
+      <p15:sldGuideLst xmlns:p15="http://schemas.microsoft.com/office/powerpoint/2012/main"/>
+    </p:ext>
+  </p:extLst>
 </p:presentation>
 </file>
 
@@ -192,7 +198,7 @@
           <a:p>
             <a:fld id="{958E9C4D-4142-EC44-9E2A-DD8A0B212403}" type="datetimeFigureOut">
               <a:rPr lang="en-US" smtClean="0"/>
-              <a:t>12/1/17</a:t>
+              <a:t>12/2/17</a:t>
             </a:fld>
             <a:endParaRPr lang="en-US"/>
           </a:p>
@@ -591,7 +597,7 @@
           <a:p>
             <a:fld id="{D8609535-D2FC-DA41-9DF9-D37339CDBD77}" type="datetimeFigureOut">
               <a:rPr lang="en-US" smtClean="0"/>
-              <a:t>12/1/17</a:t>
+              <a:t>12/2/17</a:t>
             </a:fld>
             <a:endParaRPr lang="en-US"/>
           </a:p>
@@ -761,7 +767,7 @@
           <a:p>
             <a:fld id="{D8609535-D2FC-DA41-9DF9-D37339CDBD77}" type="datetimeFigureOut">
               <a:rPr lang="en-US" smtClean="0"/>
-              <a:t>12/1/17</a:t>
+              <a:t>12/2/17</a:t>
             </a:fld>
             <a:endParaRPr lang="en-US"/>
           </a:p>
@@ -941,7 +947,7 @@
           <a:p>
             <a:fld id="{D8609535-D2FC-DA41-9DF9-D37339CDBD77}" type="datetimeFigureOut">
               <a:rPr lang="en-US" smtClean="0"/>
-              <a:t>12/1/17</a:t>
+              <a:t>12/2/17</a:t>
             </a:fld>
             <a:endParaRPr lang="en-US"/>
           </a:p>
@@ -1111,7 +1117,7 @@
           <a:p>
             <a:fld id="{D8609535-D2FC-DA41-9DF9-D37339CDBD77}" type="datetimeFigureOut">
               <a:rPr lang="en-US" smtClean="0"/>
-              <a:t>12/1/17</a:t>
+              <a:t>12/2/17</a:t>
             </a:fld>
             <a:endParaRPr lang="en-US"/>
           </a:p>
@@ -1357,7 +1363,7 @@
           <a:p>
             <a:fld id="{D8609535-D2FC-DA41-9DF9-D37339CDBD77}" type="datetimeFigureOut">
               <a:rPr lang="en-US" smtClean="0"/>
-              <a:t>12/1/17</a:t>
+              <a:t>12/2/17</a:t>
             </a:fld>
             <a:endParaRPr lang="en-US"/>
           </a:p>
@@ -1589,7 +1595,7 @@
           <a:p>
             <a:fld id="{D8609535-D2FC-DA41-9DF9-D37339CDBD77}" type="datetimeFigureOut">
               <a:rPr lang="en-US" smtClean="0"/>
-              <a:t>12/1/17</a:t>
+              <a:t>12/2/17</a:t>
             </a:fld>
             <a:endParaRPr lang="en-US"/>
           </a:p>
@@ -1956,7 +1962,7 @@
           <a:p>
             <a:fld id="{D8609535-D2FC-DA41-9DF9-D37339CDBD77}" type="datetimeFigureOut">
               <a:rPr lang="en-US" smtClean="0"/>
-              <a:t>12/1/17</a:t>
+              <a:t>12/2/17</a:t>
             </a:fld>
             <a:endParaRPr lang="en-US"/>
           </a:p>
@@ -2074,7 +2080,7 @@
           <a:p>
             <a:fld id="{D8609535-D2FC-DA41-9DF9-D37339CDBD77}" type="datetimeFigureOut">
               <a:rPr lang="en-US" smtClean="0"/>
-              <a:t>12/1/17</a:t>
+              <a:t>12/2/17</a:t>
             </a:fld>
             <a:endParaRPr lang="en-US"/>
           </a:p>
@@ -2169,7 +2175,7 @@
           <a:p>
             <a:fld id="{D8609535-D2FC-DA41-9DF9-D37339CDBD77}" type="datetimeFigureOut">
               <a:rPr lang="en-US" smtClean="0"/>
-              <a:t>12/1/17</a:t>
+              <a:t>12/2/17</a:t>
             </a:fld>
             <a:endParaRPr lang="en-US"/>
           </a:p>
@@ -2446,7 +2452,7 @@
           <a:p>
             <a:fld id="{D8609535-D2FC-DA41-9DF9-D37339CDBD77}" type="datetimeFigureOut">
               <a:rPr lang="en-US" smtClean="0"/>
-              <a:t>12/1/17</a:t>
+              <a:t>12/2/17</a:t>
             </a:fld>
             <a:endParaRPr lang="en-US"/>
           </a:p>
@@ -2699,7 +2705,7 @@
           <a:p>
             <a:fld id="{D8609535-D2FC-DA41-9DF9-D37339CDBD77}" type="datetimeFigureOut">
               <a:rPr lang="en-US" smtClean="0"/>
-              <a:t>12/1/17</a:t>
+              <a:t>12/2/17</a:t>
             </a:fld>
             <a:endParaRPr lang="en-US"/>
           </a:p>
@@ -2912,7 +2918,7 @@
           <a:p>
             <a:fld id="{D8609535-D2FC-DA41-9DF9-D37339CDBD77}" type="datetimeFigureOut">
               <a:rPr lang="en-US" smtClean="0"/>
-              <a:t>12/1/17</a:t>
+              <a:t>12/2/17</a:t>
             </a:fld>
             <a:endParaRPr lang="en-US"/>
           </a:p>
@@ -3500,7 +3506,7 @@
         </p:blipFill>
         <p:spPr>
           <a:xfrm>
-            <a:off x="6365655" y="4654676"/>
+            <a:off x="4826022" y="4040067"/>
             <a:ext cx="2307622" cy="1350615"/>
           </a:xfrm>
           <a:prstGeom prst="rect">
@@ -3548,7 +3554,7 @@
         </p:blipFill>
         <p:spPr>
           <a:xfrm>
-            <a:off x="3435350" y="2825750"/>
+            <a:off x="4330183" y="193907"/>
             <a:ext cx="5321300" cy="1206500"/>
           </a:xfrm>
           <a:prstGeom prst="rect">
@@ -3620,7 +3626,7 @@
         </p:blipFill>
         <p:spPr>
           <a:xfrm>
-            <a:off x="4375150" y="1708150"/>
+            <a:off x="7133644" y="1099218"/>
             <a:ext cx="3441700" cy="3441700"/>
           </a:xfrm>
           <a:prstGeom prst="rect">
@@ -3632,6 +3638,242 @@
     <p:extLst>
       <p:ext uri="{BB962C8B-B14F-4D97-AF65-F5344CB8AC3E}">
         <p14:creationId xmlns:p14="http://schemas.microsoft.com/office/powerpoint/2010/main" val="813829579"/>
+      </p:ext>
+    </p:extLst>
+  </p:cSld>
+  <p:clrMapOvr>
+    <a:masterClrMapping/>
+  </p:clrMapOvr>
+</p:sld>
+</file>
+
+<file path=ppt/slides/slide2.xml><?xml version="1.0" encoding="utf-8"?>
+<p:sld xmlns:a="http://schemas.openxmlformats.org/drawingml/2006/main" xmlns:r="http://schemas.openxmlformats.org/officeDocument/2006/relationships" xmlns:p="http://schemas.openxmlformats.org/presentationml/2006/main">
+  <p:cSld>
+    <p:spTree>
+      <p:nvGrpSpPr>
+        <p:cNvPr id="1" name=""/>
+        <p:cNvGrpSpPr/>
+        <p:nvPr/>
+      </p:nvGrpSpPr>
+      <p:grpSpPr>
+        <a:xfrm>
+          <a:off x="0" y="0"/>
+          <a:ext cx="0" cy="0"/>
+          <a:chOff x="0" y="0"/>
+          <a:chExt cx="0" cy="0"/>
+        </a:xfrm>
+      </p:grpSpPr>
+      <p:pic>
+        <p:nvPicPr>
+          <p:cNvPr id="4" name="Picture 3"/>
+          <p:cNvPicPr>
+            <a:picLocks noChangeAspect="1"/>
+          </p:cNvPicPr>
+          <p:nvPr/>
+        </p:nvPicPr>
+        <p:blipFill>
+          <a:blip r:embed="rId2"/>
+          <a:stretch>
+            <a:fillRect/>
+          </a:stretch>
+        </p:blipFill>
+        <p:spPr>
+          <a:xfrm>
+            <a:off x="0" y="235857"/>
+            <a:ext cx="12192000" cy="6386286"/>
+          </a:xfrm>
+          <a:prstGeom prst="rect">
+            <a:avLst/>
+          </a:prstGeom>
+        </p:spPr>
+      </p:pic>
+      <p:pic>
+        <p:nvPicPr>
+          <p:cNvPr id="5" name="Picture 4"/>
+          <p:cNvPicPr>
+            <a:picLocks noChangeAspect="1"/>
+          </p:cNvPicPr>
+          <p:nvPr/>
+        </p:nvPicPr>
+        <p:blipFill>
+          <a:blip r:embed="rId3"/>
+          <a:stretch>
+            <a:fillRect/>
+          </a:stretch>
+        </p:blipFill>
+        <p:spPr>
+          <a:xfrm>
+            <a:off x="243069" y="1122744"/>
+            <a:ext cx="3563583" cy="2824223"/>
+          </a:xfrm>
+          <a:prstGeom prst="rect">
+            <a:avLst/>
+          </a:prstGeom>
+        </p:spPr>
+      </p:pic>
+      <p:pic>
+        <p:nvPicPr>
+          <p:cNvPr id="6" name="Picture 5"/>
+          <p:cNvPicPr>
+            <a:picLocks noChangeAspect="1"/>
+          </p:cNvPicPr>
+          <p:nvPr/>
+        </p:nvPicPr>
+        <p:blipFill>
+          <a:blip r:embed="rId4"/>
+          <a:stretch>
+            <a:fillRect/>
+          </a:stretch>
+        </p:blipFill>
+        <p:spPr>
+          <a:xfrm>
+            <a:off x="4469837" y="5066661"/>
+            <a:ext cx="3704044" cy="839819"/>
+          </a:xfrm>
+          <a:prstGeom prst="rect">
+            <a:avLst/>
+          </a:prstGeom>
+        </p:spPr>
+      </p:pic>
+      <p:grpSp>
+        <p:nvGrpSpPr>
+          <p:cNvPr id="7" name="Group 6"/>
+          <p:cNvGrpSpPr/>
+          <p:nvPr/>
+        </p:nvGrpSpPr>
+        <p:grpSpPr>
+          <a:xfrm>
+            <a:off x="4469837" y="4549911"/>
+            <a:ext cx="3987936" cy="502767"/>
+            <a:chOff x="544252" y="4024492"/>
+            <a:chExt cx="7673289" cy="967388"/>
+          </a:xfrm>
+        </p:grpSpPr>
+        <p:pic>
+          <p:nvPicPr>
+            <p:cNvPr id="8" name="Picture 7"/>
+            <p:cNvPicPr>
+              <a:picLocks noChangeAspect="1"/>
+            </p:cNvPicPr>
+            <p:nvPr/>
+          </p:nvPicPr>
+          <p:blipFill>
+            <a:blip r:embed="rId5"/>
+            <a:stretch>
+              <a:fillRect/>
+            </a:stretch>
+          </p:blipFill>
+          <p:spPr>
+            <a:xfrm>
+              <a:off x="544252" y="4024492"/>
+              <a:ext cx="2557763" cy="940483"/>
+            </a:xfrm>
+            <a:prstGeom prst="rect">
+              <a:avLst/>
+            </a:prstGeom>
+          </p:spPr>
+        </p:pic>
+        <p:pic>
+          <p:nvPicPr>
+            <p:cNvPr id="9" name="Picture 8"/>
+            <p:cNvPicPr>
+              <a:picLocks noChangeAspect="1"/>
+            </p:cNvPicPr>
+            <p:nvPr/>
+          </p:nvPicPr>
+          <p:blipFill>
+            <a:blip r:embed="rId5"/>
+            <a:stretch>
+              <a:fillRect/>
+            </a:stretch>
+          </p:blipFill>
+          <p:spPr>
+            <a:xfrm>
+              <a:off x="3102015" y="4024492"/>
+              <a:ext cx="2557763" cy="940483"/>
+            </a:xfrm>
+            <a:prstGeom prst="rect">
+              <a:avLst/>
+            </a:prstGeom>
+          </p:spPr>
+        </p:pic>
+        <p:pic>
+          <p:nvPicPr>
+            <p:cNvPr id="10" name="Picture 9"/>
+            <p:cNvPicPr>
+              <a:picLocks noChangeAspect="1"/>
+            </p:cNvPicPr>
+            <p:nvPr/>
+          </p:nvPicPr>
+          <p:blipFill>
+            <a:blip r:embed="rId5"/>
+            <a:stretch>
+              <a:fillRect/>
+            </a:stretch>
+          </p:blipFill>
+          <p:spPr>
+            <a:xfrm>
+              <a:off x="5659778" y="4051397"/>
+              <a:ext cx="2557763" cy="940483"/>
+            </a:xfrm>
+            <a:prstGeom prst="rect">
+              <a:avLst/>
+            </a:prstGeom>
+          </p:spPr>
+        </p:pic>
+      </p:grpSp>
+      <p:pic>
+        <p:nvPicPr>
+          <p:cNvPr id="12" name="Picture 11"/>
+          <p:cNvPicPr>
+            <a:picLocks noChangeAspect="1"/>
+          </p:cNvPicPr>
+          <p:nvPr/>
+        </p:nvPicPr>
+        <p:blipFill>
+          <a:blip r:embed="rId6"/>
+          <a:stretch>
+            <a:fillRect/>
+          </a:stretch>
+        </p:blipFill>
+        <p:spPr>
+          <a:xfrm>
+            <a:off x="243069" y="4731845"/>
+            <a:ext cx="1193845" cy="1350615"/>
+          </a:xfrm>
+          <a:prstGeom prst="rect">
+            <a:avLst/>
+          </a:prstGeom>
+        </p:spPr>
+      </p:pic>
+      <p:pic>
+        <p:nvPicPr>
+          <p:cNvPr id="13" name="Picture 12"/>
+          <p:cNvPicPr>
+            <a:picLocks noChangeAspect="1"/>
+          </p:cNvPicPr>
+          <p:nvPr/>
+        </p:nvPicPr>
+        <p:blipFill rotWithShape="1">
+          <a:blip r:embed="rId7"/>
+          <a:srcRect r="81101"/>
+          <a:stretch/>
+        </p:blipFill>
+        <p:spPr>
+          <a:xfrm>
+            <a:off x="1436914" y="4991270"/>
+            <a:ext cx="2186502" cy="990600"/>
+          </a:xfrm>
+          <a:prstGeom prst="rect">
+            <a:avLst/>
+          </a:prstGeom>
+        </p:spPr>
+      </p:pic>
+    </p:spTree>
+    <p:extLst>
+      <p:ext uri="{BB962C8B-B14F-4D97-AF65-F5344CB8AC3E}">
+        <p14:creationId xmlns:p14="http://schemas.microsoft.com/office/powerpoint/2010/main" val="316551898"/>
       </p:ext>
     </p:extLst>
   </p:cSld>

</xml_diff>